<commit_message>
Revert "rm tammy file"
This reverts commit 940c4b7b5985407e409cedaef3e3da1b145581d3, reversing
changes made to ea5cf89ce15f8e84dff67ff0e2c0e0aa029212fb.
</commit_message>
<xml_diff>
--- a/World Happiness Report .pptx
+++ b/World Happiness Report .pptx
@@ -5,17 +5,13 @@
     <p:sldMasterId id="2147483824" r:id="rId4"/>
   </p:sldMasterIdLst>
   <p:notesMasterIdLst>
-    <p:notesMasterId r:id="rId13"/>
+    <p:notesMasterId r:id="rId9"/>
   </p:notesMasterIdLst>
   <p:sldIdLst>
     <p:sldId id="256" r:id="rId5"/>
     <p:sldId id="258" r:id="rId6"/>
     <p:sldId id="260" r:id="rId7"/>
     <p:sldId id="261" r:id="rId8"/>
-    <p:sldId id="262" r:id="rId9"/>
-    <p:sldId id="264" r:id="rId10"/>
-    <p:sldId id="263" r:id="rId11"/>
-    <p:sldId id="265" r:id="rId12"/>
   </p:sldIdLst>
   <p:sldSz cx="12192000" cy="6858000"/>
   <p:notesSz cx="6858000" cy="9144000"/>
@@ -132,6 +128,14 @@
     </p:extLst>
   </p:cmAuthor>
 </p:cmAuthorLst>
+</file>
+
+<file path=ppt/revisionInfo.xml><?xml version="1.0" encoding="utf-8"?>
+<p1510:revInfo xmlns:a="http://schemas.openxmlformats.org/drawingml/2006/main" xmlns:r="http://schemas.openxmlformats.org/officeDocument/2006/relationships" xmlns:p1510="http://schemas.microsoft.com/office/powerpoint/2015/10/main">
+  <p1510:revLst>
+    <p1510:client id="{8D7B186A-7087-46A9-A466-4877AAB8FBC1}" v="106" dt="2020-01-09T21:08:45.827"/>
+  </p1510:revLst>
+</p1510:revInfo>
 </file>
 
 <file path=ppt/notesMasters/notesMaster1.xml><?xml version="1.0" encoding="utf-8"?>
@@ -5357,19 +5361,6 @@
             </a:r>
           </a:p>
           <a:p>
-            <a:pPr marL="285750" indent="-228600">
-              <a:lnSpc>
-                <a:spcPct val="90000"/>
-              </a:lnSpc>
-              <a:spcAft>
-                <a:spcPts val="600"/>
-              </a:spcAft>
-              <a:buFont typeface="Arial" panose="020B0604020202020204" pitchFamily="34" charset="0"/>
-              <a:buChar char="•"/>
-            </a:pPr>
-            <a:endParaRPr lang="en-US" sz="1400" dirty="0"/>
-          </a:p>
-          <a:p>
             <a:pPr>
               <a:lnSpc>
                 <a:spcPct val="90000"/>
@@ -5378,9 +5369,20 @@
                 <a:spcPts val="600"/>
               </a:spcAft>
             </a:pPr>
+            <a:endParaRPr lang="en-US" sz="1400" dirty="0"/>
+          </a:p>
+          <a:p>
+            <a:pPr>
+              <a:lnSpc>
+                <a:spcPct val="90000"/>
+              </a:lnSpc>
+              <a:spcAft>
+                <a:spcPts val="600"/>
+              </a:spcAft>
+            </a:pPr>
             <a:r>
               <a:rPr lang="en-US" sz="1600" b="1" dirty="0"/>
-              <a:t>six factors were looked at to contribute to making life evaluation higher :</a:t>
+              <a:t>The happiness score consist of six factors that contribute to making life evaluation higher :</a:t>
             </a:r>
           </a:p>
           <a:p>
@@ -5649,428 +5651,82 @@
           </a:p>
         </p:txBody>
       </p:sp>
-      <p:pic>
-        <p:nvPicPr>
-          <p:cNvPr id="6" name="Picture 5">
-            <a:extLst>
-              <a:ext uri="{FF2B5EF4-FFF2-40B4-BE49-F238E27FC236}">
-                <a16:creationId xmlns:a16="http://schemas.microsoft.com/office/drawing/2014/main" id="{60902883-0EBE-C446-A2F8-FCB68127D770}"/>
-              </a:ext>
-            </a:extLst>
-          </p:cNvPr>
-          <p:cNvPicPr>
-            <a:picLocks noChangeAspect="1"/>
-          </p:cNvPicPr>
+      <p:sp>
+        <p:nvSpPr>
+          <p:cNvPr id="3" name="TextBox 2">
+            <a:extLst>
+              <a:ext uri="{FF2B5EF4-FFF2-40B4-BE49-F238E27FC236}">
+                <a16:creationId xmlns:a16="http://schemas.microsoft.com/office/drawing/2014/main" id="{93C28B76-38AF-1C40-9AD4-46C004F7C242}"/>
+              </a:ext>
+            </a:extLst>
+          </p:cNvPr>
+          <p:cNvSpPr txBox="1"/>
           <p:nvPr/>
-        </p:nvPicPr>
-        <p:blipFill>
-          <a:blip r:embed="rId2">
-            <a:clrChange>
-              <a:clrFrom>
-                <a:srgbClr val="FFFFFF"/>
-              </a:clrFrom>
-              <a:clrTo>
-                <a:srgbClr val="FFFFFF">
-                  <a:alpha val="0"/>
-                </a:srgbClr>
-              </a:clrTo>
-            </a:clrChange>
-            <a:extLst>
-              <a:ext uri="{28A0092B-C50C-407E-A947-70E740481C1C}">
-                <a14:useLocalDpi xmlns:a14="http://schemas.microsoft.com/office/drawing/2010/main" val="0"/>
-              </a:ext>
-            </a:extLst>
-          </a:blip>
-          <a:stretch>
-            <a:fillRect/>
-          </a:stretch>
-        </p:blipFill>
+        </p:nvSpPr>
         <p:spPr>
           <a:xfrm>
-            <a:off x="861834" y="756705"/>
-            <a:ext cx="10823944" cy="6207618"/>
+            <a:off x="307730" y="4387362"/>
+            <a:ext cx="4985239" cy="2308324"/>
+          </a:xfrm>
+          <a:prstGeom prst="rect">
+            <a:avLst/>
+          </a:prstGeom>
+          <a:noFill/>
+        </p:spPr>
+        <p:txBody>
+          <a:bodyPr wrap="square" rtlCol="0">
+            <a:spAutoFit/>
+          </a:bodyPr>
+          <a:lstStyle/>
+          <a:p>
+            <a:r>
+              <a:rPr lang="en-US" dirty="0"/>
+              <a:t>We have obtained the heatmap of correlation among the variables. The color palette in the side represents the amount of correlation among the variables. The lighter shade represents high correlation. We can see that happiness score is highly correlated with GDP per capita, family and life expectancy. It is least correlated with generosity.</a:t>
+            </a:r>
+          </a:p>
+        </p:txBody>
+      </p:sp>
+      <p:sp>
+        <p:nvSpPr>
+          <p:cNvPr id="4" name="Rectangle 3">
+            <a:extLst>
+              <a:ext uri="{FF2B5EF4-FFF2-40B4-BE49-F238E27FC236}">
+                <a16:creationId xmlns:a16="http://schemas.microsoft.com/office/drawing/2014/main" id="{ACE9D2BE-1AEC-6C49-AD15-AD06ADFE02D0}"/>
+              </a:ext>
+            </a:extLst>
+          </p:cNvPr>
+          <p:cNvSpPr/>
+          <p:nvPr/>
+        </p:nvSpPr>
+        <p:spPr>
+          <a:xfrm>
+            <a:off x="5424941" y="5934780"/>
+            <a:ext cx="4911794" cy="369332"/>
           </a:xfrm>
           <a:prstGeom prst="rect">
             <a:avLst/>
           </a:prstGeom>
         </p:spPr>
-      </p:pic>
+        <p:txBody>
+          <a:bodyPr wrap="none">
+            <a:spAutoFit/>
+          </a:bodyPr>
+          <a:lstStyle/>
+          <a:p>
+            <a:r>
+              <a:rPr lang="en-US" dirty="0">
+                <a:hlinkClick r:id="rId2"/>
+              </a:rPr>
+              <a:t>file:///Users/tura-agu/project-one/temp-plot.html</a:t>
+            </a:r>
+            <a:endParaRPr lang="en-US" dirty="0"/>
+          </a:p>
+        </p:txBody>
+      </p:sp>
     </p:spTree>
     <p:extLst>
       <p:ext uri="{BB962C8B-B14F-4D97-AF65-F5344CB8AC3E}">
         <p14:creationId xmlns:p14="http://schemas.microsoft.com/office/powerpoint/2010/main" val="4186983860"/>
-      </p:ext>
-    </p:extLst>
-  </p:cSld>
-  <p:clrMapOvr>
-    <a:masterClrMapping/>
-  </p:clrMapOvr>
-</p:sld>
-</file>
-
-<file path=ppt/slides/slide5.xml><?xml version="1.0" encoding="utf-8"?>
-<p:sld xmlns:a="http://schemas.openxmlformats.org/drawingml/2006/main" xmlns:r="http://schemas.openxmlformats.org/officeDocument/2006/relationships" xmlns:p="http://schemas.openxmlformats.org/presentationml/2006/main">
-  <p:cSld>
-    <p:spTree>
-      <p:nvGrpSpPr>
-        <p:cNvPr id="1" name=""/>
-        <p:cNvGrpSpPr/>
-        <p:nvPr/>
-      </p:nvGrpSpPr>
-      <p:grpSpPr>
-        <a:xfrm>
-          <a:off x="0" y="0"/>
-          <a:ext cx="0" cy="0"/>
-          <a:chOff x="0" y="0"/>
-          <a:chExt cx="0" cy="0"/>
-        </a:xfrm>
-      </p:grpSpPr>
-      <p:pic>
-        <p:nvPicPr>
-          <p:cNvPr id="5" name="Picture 4">
-            <a:extLst>
-              <a:ext uri="{FF2B5EF4-FFF2-40B4-BE49-F238E27FC236}">
-                <a16:creationId xmlns:a16="http://schemas.microsoft.com/office/drawing/2014/main" id="{7E6DDA8B-6DE7-BC4D-8C56-D99CD1C88366}"/>
-              </a:ext>
-            </a:extLst>
-          </p:cNvPr>
-          <p:cNvPicPr>
-            <a:picLocks noChangeAspect="1"/>
-          </p:cNvPicPr>
-          <p:nvPr/>
-        </p:nvPicPr>
-        <p:blipFill>
-          <a:blip r:embed="rId2">
-            <a:extLst>
-              <a:ext uri="{28A0092B-C50C-407E-A947-70E740481C1C}">
-                <a14:useLocalDpi xmlns:a14="http://schemas.microsoft.com/office/drawing/2010/main" val="0"/>
-              </a:ext>
-            </a:extLst>
-          </a:blip>
-          <a:stretch>
-            <a:fillRect/>
-          </a:stretch>
-        </p:blipFill>
-        <p:spPr>
-          <a:xfrm>
-            <a:off x="123290" y="1532545"/>
-            <a:ext cx="11410188" cy="4498386"/>
-          </a:xfrm>
-          <a:prstGeom prst="rect">
-            <a:avLst/>
-          </a:prstGeom>
-        </p:spPr>
-      </p:pic>
-    </p:spTree>
-    <p:extLst>
-      <p:ext uri="{BB962C8B-B14F-4D97-AF65-F5344CB8AC3E}">
-        <p14:creationId xmlns:p14="http://schemas.microsoft.com/office/powerpoint/2010/main" val="3235954156"/>
-      </p:ext>
-    </p:extLst>
-  </p:cSld>
-  <p:clrMapOvr>
-    <a:masterClrMapping/>
-  </p:clrMapOvr>
-</p:sld>
-</file>
-
-<file path=ppt/slides/slide6.xml><?xml version="1.0" encoding="utf-8"?>
-<p:sld xmlns:a="http://schemas.openxmlformats.org/drawingml/2006/main" xmlns:r="http://schemas.openxmlformats.org/officeDocument/2006/relationships" xmlns:p="http://schemas.openxmlformats.org/presentationml/2006/main">
-  <p:cSld>
-    <p:spTree>
-      <p:nvGrpSpPr>
-        <p:cNvPr id="1" name=""/>
-        <p:cNvGrpSpPr/>
-        <p:nvPr/>
-      </p:nvGrpSpPr>
-      <p:grpSpPr>
-        <a:xfrm>
-          <a:off x="0" y="0"/>
-          <a:ext cx="0" cy="0"/>
-          <a:chOff x="0" y="0"/>
-          <a:chExt cx="0" cy="0"/>
-        </a:xfrm>
-      </p:grpSpPr>
-      <p:pic>
-        <p:nvPicPr>
-          <p:cNvPr id="2" name="Picture 1">
-            <a:extLst>
-              <a:ext uri="{FF2B5EF4-FFF2-40B4-BE49-F238E27FC236}">
-                <a16:creationId xmlns:a16="http://schemas.microsoft.com/office/drawing/2014/main" id="{E2A28A09-C732-8342-8DDC-54B6686AF8F9}"/>
-              </a:ext>
-            </a:extLst>
-          </p:cNvPr>
-          <p:cNvPicPr>
-            <a:picLocks noChangeAspect="1"/>
-          </p:cNvPicPr>
-          <p:nvPr/>
-        </p:nvPicPr>
-        <p:blipFill>
-          <a:blip r:embed="rId2">
-            <a:extLst>
-              <a:ext uri="{28A0092B-C50C-407E-A947-70E740481C1C}">
-                <a14:useLocalDpi xmlns:a14="http://schemas.microsoft.com/office/drawing/2010/main" val="0"/>
-              </a:ext>
-            </a:extLst>
-          </a:blip>
-          <a:stretch>
-            <a:fillRect/>
-          </a:stretch>
-        </p:blipFill>
-        <p:spPr>
-          <a:xfrm>
-            <a:off x="758575" y="336479"/>
-            <a:ext cx="10674849" cy="3208106"/>
-          </a:xfrm>
-          <a:prstGeom prst="rect">
-            <a:avLst/>
-          </a:prstGeom>
-        </p:spPr>
-      </p:pic>
-      <p:pic>
-        <p:nvPicPr>
-          <p:cNvPr id="4" name="Picture 3">
-            <a:extLst>
-              <a:ext uri="{FF2B5EF4-FFF2-40B4-BE49-F238E27FC236}">
-                <a16:creationId xmlns:a16="http://schemas.microsoft.com/office/drawing/2014/main" id="{E4D038A7-B10F-5E47-8B95-066BE2D7CC6E}"/>
-              </a:ext>
-            </a:extLst>
-          </p:cNvPr>
-          <p:cNvPicPr>
-            <a:picLocks noChangeAspect="1"/>
-          </p:cNvPicPr>
-          <p:nvPr/>
-        </p:nvPicPr>
-        <p:blipFill>
-          <a:blip r:embed="rId3">
-            <a:extLst>
-              <a:ext uri="{28A0092B-C50C-407E-A947-70E740481C1C}">
-                <a14:useLocalDpi xmlns:a14="http://schemas.microsoft.com/office/drawing/2010/main" val="0"/>
-              </a:ext>
-            </a:extLst>
-          </a:blip>
-          <a:stretch>
-            <a:fillRect/>
-          </a:stretch>
-        </p:blipFill>
-        <p:spPr>
-          <a:xfrm>
-            <a:off x="758575" y="3429000"/>
-            <a:ext cx="10674849" cy="3313415"/>
-          </a:xfrm>
-          <a:prstGeom prst="rect">
-            <a:avLst/>
-          </a:prstGeom>
-        </p:spPr>
-      </p:pic>
-    </p:spTree>
-    <p:extLst>
-      <p:ext uri="{BB962C8B-B14F-4D97-AF65-F5344CB8AC3E}">
-        <p14:creationId xmlns:p14="http://schemas.microsoft.com/office/powerpoint/2010/main" val="1595920510"/>
-      </p:ext>
-    </p:extLst>
-  </p:cSld>
-  <p:clrMapOvr>
-    <a:masterClrMapping/>
-  </p:clrMapOvr>
-</p:sld>
-</file>
-
-<file path=ppt/slides/slide7.xml><?xml version="1.0" encoding="utf-8"?>
-<p:sld xmlns:a="http://schemas.openxmlformats.org/drawingml/2006/main" xmlns:r="http://schemas.openxmlformats.org/officeDocument/2006/relationships" xmlns:p="http://schemas.openxmlformats.org/presentationml/2006/main">
-  <p:cSld>
-    <p:spTree>
-      <p:nvGrpSpPr>
-        <p:cNvPr id="1" name=""/>
-        <p:cNvGrpSpPr/>
-        <p:nvPr/>
-      </p:nvGrpSpPr>
-      <p:grpSpPr>
-        <a:xfrm>
-          <a:off x="0" y="0"/>
-          <a:ext cx="0" cy="0"/>
-          <a:chOff x="0" y="0"/>
-          <a:chExt cx="0" cy="0"/>
-        </a:xfrm>
-      </p:grpSpPr>
-      <p:pic>
-        <p:nvPicPr>
-          <p:cNvPr id="3" name="Picture 2">
-            <a:extLst>
-              <a:ext uri="{FF2B5EF4-FFF2-40B4-BE49-F238E27FC236}">
-                <a16:creationId xmlns:a16="http://schemas.microsoft.com/office/drawing/2014/main" id="{809D0EED-F4B4-4645-B6CE-A99B4E88D06B}"/>
-              </a:ext>
-            </a:extLst>
-          </p:cNvPr>
-          <p:cNvPicPr>
-            <a:picLocks noChangeAspect="1"/>
-          </p:cNvPicPr>
-          <p:nvPr/>
-        </p:nvPicPr>
-        <p:blipFill>
-          <a:blip r:embed="rId2">
-            <a:extLst>
-              <a:ext uri="{28A0092B-C50C-407E-A947-70E740481C1C}">
-                <a14:useLocalDpi xmlns:a14="http://schemas.microsoft.com/office/drawing/2010/main" val="0"/>
-              </a:ext>
-            </a:extLst>
-          </a:blip>
-          <a:stretch>
-            <a:fillRect/>
-          </a:stretch>
-        </p:blipFill>
-        <p:spPr>
-          <a:xfrm>
-            <a:off x="988032" y="98118"/>
-            <a:ext cx="10705673" cy="3318553"/>
-          </a:xfrm>
-          <a:prstGeom prst="rect">
-            <a:avLst/>
-          </a:prstGeom>
-        </p:spPr>
-      </p:pic>
-      <p:pic>
-        <p:nvPicPr>
-          <p:cNvPr id="24" name="Picture 23">
-            <a:extLst>
-              <a:ext uri="{FF2B5EF4-FFF2-40B4-BE49-F238E27FC236}">
-                <a16:creationId xmlns:a16="http://schemas.microsoft.com/office/drawing/2014/main" id="{0D442FAE-EB81-E64B-B056-341130EF3687}"/>
-              </a:ext>
-            </a:extLst>
-          </p:cNvPr>
-          <p:cNvPicPr>
-            <a:picLocks noChangeAspect="1"/>
-          </p:cNvPicPr>
-          <p:nvPr/>
-        </p:nvPicPr>
-        <p:blipFill>
-          <a:blip r:embed="rId3">
-            <a:extLst>
-              <a:ext uri="{28A0092B-C50C-407E-A947-70E740481C1C}">
-                <a14:useLocalDpi xmlns:a14="http://schemas.microsoft.com/office/drawing/2010/main" val="0"/>
-              </a:ext>
-            </a:extLst>
-          </a:blip>
-          <a:stretch>
-            <a:fillRect/>
-          </a:stretch>
-        </p:blipFill>
-        <p:spPr>
-          <a:xfrm>
-            <a:off x="988032" y="3318553"/>
-            <a:ext cx="10705672" cy="3441329"/>
-          </a:xfrm>
-          <a:prstGeom prst="rect">
-            <a:avLst/>
-          </a:prstGeom>
-        </p:spPr>
-      </p:pic>
-    </p:spTree>
-    <p:extLst>
-      <p:ext uri="{BB962C8B-B14F-4D97-AF65-F5344CB8AC3E}">
-        <p14:creationId xmlns:p14="http://schemas.microsoft.com/office/powerpoint/2010/main" val="735382775"/>
-      </p:ext>
-    </p:extLst>
-  </p:cSld>
-  <p:clrMapOvr>
-    <a:masterClrMapping/>
-  </p:clrMapOvr>
-</p:sld>
-</file>
-
-<file path=ppt/slides/slide8.xml><?xml version="1.0" encoding="utf-8"?>
-<p:sld xmlns:a="http://schemas.openxmlformats.org/drawingml/2006/main" xmlns:r="http://schemas.openxmlformats.org/officeDocument/2006/relationships" xmlns:p="http://schemas.openxmlformats.org/presentationml/2006/main">
-  <p:cSld>
-    <p:spTree>
-      <p:nvGrpSpPr>
-        <p:cNvPr id="1" name=""/>
-        <p:cNvGrpSpPr/>
-        <p:nvPr/>
-      </p:nvGrpSpPr>
-      <p:grpSpPr>
-        <a:xfrm>
-          <a:off x="0" y="0"/>
-          <a:ext cx="0" cy="0"/>
-          <a:chOff x="0" y="0"/>
-          <a:chExt cx="0" cy="0"/>
-        </a:xfrm>
-      </p:grpSpPr>
-      <p:pic>
-        <p:nvPicPr>
-          <p:cNvPr id="4" name="Picture 3">
-            <a:extLst>
-              <a:ext uri="{FF2B5EF4-FFF2-40B4-BE49-F238E27FC236}">
-                <a16:creationId xmlns:a16="http://schemas.microsoft.com/office/drawing/2014/main" id="{91890948-AA8B-7E40-8564-7987F1695D98}"/>
-              </a:ext>
-            </a:extLst>
-          </p:cNvPr>
-          <p:cNvPicPr>
-            <a:picLocks noChangeAspect="1"/>
-          </p:cNvPicPr>
-          <p:nvPr/>
-        </p:nvPicPr>
-        <p:blipFill>
-          <a:blip r:embed="rId2">
-            <a:extLst>
-              <a:ext uri="{28A0092B-C50C-407E-A947-70E740481C1C}">
-                <a14:useLocalDpi xmlns:a14="http://schemas.microsoft.com/office/drawing/2010/main" val="0"/>
-              </a:ext>
-            </a:extLst>
-          </a:blip>
-          <a:stretch>
-            <a:fillRect/>
-          </a:stretch>
-        </p:blipFill>
-        <p:spPr>
-          <a:xfrm>
-            <a:off x="1171254" y="0"/>
-            <a:ext cx="10181691" cy="3325403"/>
-          </a:xfrm>
-          <a:prstGeom prst="rect">
-            <a:avLst/>
-          </a:prstGeom>
-        </p:spPr>
-      </p:pic>
-      <p:pic>
-        <p:nvPicPr>
-          <p:cNvPr id="6" name="Picture 5">
-            <a:extLst>
-              <a:ext uri="{FF2B5EF4-FFF2-40B4-BE49-F238E27FC236}">
-                <a16:creationId xmlns:a16="http://schemas.microsoft.com/office/drawing/2014/main" id="{4CA4880C-A8D4-C94B-B9BA-2887F8DFC648}"/>
-              </a:ext>
-            </a:extLst>
-          </p:cNvPr>
-          <p:cNvPicPr>
-            <a:picLocks noChangeAspect="1"/>
-          </p:cNvPicPr>
-          <p:nvPr/>
-        </p:nvPicPr>
-        <p:blipFill>
-          <a:blip r:embed="rId3">
-            <a:extLst>
-              <a:ext uri="{28A0092B-C50C-407E-A947-70E740481C1C}">
-                <a14:useLocalDpi xmlns:a14="http://schemas.microsoft.com/office/drawing/2010/main" val="0"/>
-              </a:ext>
-            </a:extLst>
-          </a:blip>
-          <a:stretch>
-            <a:fillRect/>
-          </a:stretch>
-        </p:blipFill>
-        <p:spPr>
-          <a:xfrm>
-            <a:off x="1171254" y="3429000"/>
-            <a:ext cx="10181691" cy="3325402"/>
-          </a:xfrm>
-          <a:prstGeom prst="rect">
-            <a:avLst/>
-          </a:prstGeom>
-        </p:spPr>
-      </p:pic>
-    </p:spTree>
-    <p:extLst>
-      <p:ext uri="{BB962C8B-B14F-4D97-AF65-F5344CB8AC3E}">
-        <p14:creationId xmlns:p14="http://schemas.microsoft.com/office/powerpoint/2010/main" val="2569872014"/>
       </p:ext>
     </p:extLst>
   </p:cSld>

</xml_diff>